<commit_message>
Limpia data y postman
</commit_message>
<xml_diff>
--- a/design/hackaton.pptx
+++ b/design/hackaton.pptx
@@ -9535,10 +9535,10 @@
         </p:nvGrpSpPr>
         <p:grpSpPr>
           <a:xfrm>
-            <a:off x="1493431" y="2269951"/>
-            <a:ext cx="9719016" cy="3691323"/>
-            <a:chOff x="1493431" y="2269951"/>
-            <a:chExt cx="9719016" cy="3691323"/>
+            <a:off x="1493431" y="2131452"/>
+            <a:ext cx="9819570" cy="3994067"/>
+            <a:chOff x="1493431" y="2131452"/>
+            <a:chExt cx="9819570" cy="3994067"/>
           </a:xfrm>
         </p:grpSpPr>
         <p:sp>
@@ -9555,8 +9555,8 @@
           </p:nvSpPr>
           <p:spPr>
             <a:xfrm rot="20758942">
-              <a:off x="1739900" y="2269951"/>
-              <a:ext cx="3359381" cy="1046440"/>
+              <a:off x="1739900" y="2131452"/>
+              <a:ext cx="3359381" cy="1323439"/>
             </a:xfrm>
             <a:prstGeom prst="rect">
               <a:avLst/>
@@ -9584,7 +9584,13 @@
             <a:p>
               <a:r>
                 <a:rPr lang="en-US" sz="1800"/>
-                <a:t>Mesa</a:t>
+                <a:t>Yape Personas</a:t>
+              </a:r>
+            </a:p>
+            <a:p>
+              <a:r>
+                <a:rPr lang="en-US" sz="1800"/>
+                <a:t>Squad Ventas</a:t>
               </a:r>
             </a:p>
           </p:txBody>
@@ -9603,8 +9609,8 @@
           </p:nvSpPr>
           <p:spPr>
             <a:xfrm rot="703666">
-              <a:off x="7714739" y="2295694"/>
-              <a:ext cx="3020379" cy="1046440"/>
+              <a:off x="7136858" y="2157195"/>
+              <a:ext cx="4176143" cy="1323439"/>
             </a:xfrm>
             <a:prstGeom prst="rect">
               <a:avLst/>
@@ -9619,13 +9625,19 @@
             <a:p>
               <a:r>
                 <a:rPr lang="en-US" sz="4400"/>
-                <a:t>Pier Barbieri</a:t>
+                <a:t>Jean Pier Barbieri</a:t>
               </a:r>
             </a:p>
             <a:p>
               <a:r>
                 <a:rPr lang="en-US"/>
-                <a:t>Mesa</a:t>
+                <a:t>Mesa Grou</a:t>
+              </a:r>
+            </a:p>
+            <a:p>
+              <a:r>
+                <a:rPr lang="en-US"/>
+                <a:t>CIX</a:t>
               </a:r>
             </a:p>
           </p:txBody>
@@ -9691,8 +9703,8 @@
           </p:nvSpPr>
           <p:spPr>
             <a:xfrm rot="20836441">
-              <a:off x="6426200" y="4802079"/>
-              <a:ext cx="4786247" cy="1046440"/>
+              <a:off x="6426200" y="4525081"/>
+              <a:ext cx="4786247" cy="1600438"/>
             </a:xfrm>
             <a:prstGeom prst="rect">
               <a:avLst/>
@@ -9713,8 +9725,17 @@
             <a:p>
               <a:r>
                 <a:rPr lang="en-US"/>
-                <a:t>Mesa</a:t>
+                <a:t>Office Banking</a:t>
               </a:r>
+            </a:p>
+            <a:p>
+              <a:r>
+                <a:rPr lang="en-US"/>
+                <a:t>Squad Telecrédito Móvil (MBOB)</a:t>
+              </a:r>
+            </a:p>
+            <a:p>
+              <a:endParaRPr lang="en-US"/>
             </a:p>
           </p:txBody>
         </p:sp>

</xml_diff>